<commit_message>
[NLP] Word-Sense Disambiguation Summary
</commit_message>
<xml_diff>
--- a/Word-sense disambiguation.pptx
+++ b/Word-sense disambiguation.pptx
@@ -5,19 +5,18 @@
     <p:sldMasterId id="2147483778" r:id="rId1"/>
   </p:sldMasterIdLst>
   <p:notesMasterIdLst>
-    <p:notesMasterId r:id="rId12"/>
+    <p:notesMasterId r:id="rId11"/>
   </p:notesMasterIdLst>
   <p:sldIdLst>
     <p:sldId id="256" r:id="rId2"/>
     <p:sldId id="257" r:id="rId3"/>
-    <p:sldId id="258" r:id="rId4"/>
-    <p:sldId id="259" r:id="rId5"/>
-    <p:sldId id="260" r:id="rId6"/>
-    <p:sldId id="261" r:id="rId7"/>
-    <p:sldId id="262" r:id="rId8"/>
-    <p:sldId id="263" r:id="rId9"/>
-    <p:sldId id="264" r:id="rId10"/>
-    <p:sldId id="265" r:id="rId11"/>
+    <p:sldId id="259" r:id="rId4"/>
+    <p:sldId id="260" r:id="rId5"/>
+    <p:sldId id="261" r:id="rId6"/>
+    <p:sldId id="262" r:id="rId7"/>
+    <p:sldId id="263" r:id="rId8"/>
+    <p:sldId id="264" r:id="rId9"/>
+    <p:sldId id="265" r:id="rId10"/>
   </p:sldIdLst>
   <p:sldSz cx="12192000" cy="6858000"/>
   <p:notesSz cx="6858000" cy="9144000"/>
@@ -116,6 +115,11 @@
       </a:defRPr>
     </a:lvl9pPr>
   </p:defaultTextStyle>
+  <p:extLst>
+    <p:ext uri="{EFAFB233-063F-42B5-8137-9DF3F51BA10A}">
+      <p15:sldGuideLst xmlns:p15="http://schemas.microsoft.com/office/powerpoint/2012/main"/>
+    </p:ext>
+  </p:extLst>
 </p:presentation>
 </file>
 
@@ -213,7 +217,7 @@
           <a:p>
             <a:fld id="{351531EA-BAB2-49D0-9CBD-D3CBDDC67369}" type="datetimeFigureOut">
               <a:rPr lang="zh-TW" altLang="en-US" smtClean="0"/>
-              <a:t>2017/9/17</a:t>
+              <a:t>2017/9/18</a:t>
             </a:fld>
             <a:endParaRPr lang="zh-TW" altLang="en-US"/>
           </a:p>
@@ -525,21 +529,7 @@
           <a:bodyPr/>
           <a:lstStyle/>
           <a:p>
-            <a:r>
-              <a:rPr lang="en-US" altLang="zh-TW" dirty="0" smtClean="0"/>
-              <a:t>Corpus: collection of written texts. Really</a:t>
-            </a:r>
-            <a:r>
-              <a:rPr lang="en-US" altLang="zh-TW" baseline="0" dirty="0" smtClean="0"/>
-              <a:t> existing used text.</a:t>
-            </a:r>
-          </a:p>
-          <a:p>
-            <a:r>
-              <a:rPr lang="en-US" altLang="zh-TW" baseline="0" dirty="0" smtClean="0"/>
-              <a:t>All using window of n content words around and statistically analyzing those n words. Two approaches </a:t>
-            </a:r>
-            <a:endParaRPr lang="zh-TW" altLang="en-US" dirty="0"/>
+            <a:endParaRPr lang="zh-TW" altLang="en-US"/>
           </a:p>
         </p:txBody>
       </p:sp>
@@ -560,7 +550,7 @@
           <a:p>
             <a:fld id="{1521F4BC-F760-4B74-9395-E6325FFDB988}" type="slidenum">
               <a:rPr lang="zh-TW" altLang="en-US" smtClean="0"/>
-              <a:t>4</a:t>
+              <a:t>1</a:t>
             </a:fld>
             <a:endParaRPr lang="zh-TW" altLang="en-US"/>
           </a:p>
@@ -569,7 +559,7 @@
     </p:spTree>
     <p:extLst>
       <p:ext uri="{BB962C8B-B14F-4D97-AF65-F5344CB8AC3E}">
-        <p14:creationId xmlns:p14="http://schemas.microsoft.com/office/powerpoint/2010/main" val="687568491"/>
+        <p14:creationId xmlns:p14="http://schemas.microsoft.com/office/powerpoint/2010/main" val="2291337787"/>
       </p:ext>
     </p:extLst>
   </p:cSld>
@@ -624,8 +614,66 @@
           <a:lstStyle/>
           <a:p>
             <a:r>
-              <a:rPr lang="en-US" altLang="zh-TW" dirty="0" smtClean="0"/>
-              <a:t>Due to lacking training data, allows labeled and unlabeled data.</a:t>
+              <a:rPr lang="en-US" altLang="zh-TW" sz="1200" b="0" i="0" kern="1200" dirty="0" smtClean="0">
+                <a:solidFill>
+                  <a:schemeClr val="tx1"/>
+                </a:solidFill>
+                <a:effectLst/>
+                <a:latin typeface="+mn-lt"/>
+                <a:ea typeface="+mn-ea"/>
+                <a:cs typeface="+mn-cs"/>
+              </a:rPr>
+              <a:t>WSD task has two variants: "</a:t>
+            </a:r>
+            <a:r>
+              <a:rPr lang="en-US" altLang="zh-TW" sz="1200" b="0" i="0" u="none" strike="noStrike" kern="1200" dirty="0" smtClean="0">
+                <a:solidFill>
+                  <a:schemeClr val="tx1"/>
+                </a:solidFill>
+                <a:effectLst/>
+                <a:latin typeface="+mn-lt"/>
+                <a:ea typeface="+mn-ea"/>
+                <a:cs typeface="+mn-cs"/>
+                <a:hlinkClick r:id="rId3" tooltip="Lexical sample task (page does not exist)"/>
+              </a:rPr>
+              <a:t>lexical sample</a:t>
+            </a:r>
+            <a:r>
+              <a:rPr lang="en-US" altLang="zh-TW" sz="1200" b="0" i="0" kern="1200" dirty="0" smtClean="0">
+                <a:solidFill>
+                  <a:schemeClr val="tx1"/>
+                </a:solidFill>
+                <a:effectLst/>
+                <a:latin typeface="+mn-lt"/>
+                <a:ea typeface="+mn-ea"/>
+                <a:cs typeface="+mn-cs"/>
+              </a:rPr>
+              <a:t>" and "</a:t>
+            </a:r>
+            <a:r>
+              <a:rPr lang="en-US" altLang="zh-TW" sz="1200" b="0" i="0" u="none" strike="noStrike" kern="1200" dirty="0" smtClean="0">
+                <a:solidFill>
+                  <a:schemeClr val="tx1"/>
+                </a:solidFill>
+                <a:effectLst/>
+                <a:latin typeface="+mn-lt"/>
+                <a:ea typeface="+mn-ea"/>
+                <a:cs typeface="+mn-cs"/>
+                <a:hlinkClick r:id="rId4" tooltip="All-words task (page does not exist)"/>
+              </a:rPr>
+              <a:t>all words</a:t>
+            </a:r>
+            <a:r>
+              <a:rPr lang="en-US" altLang="zh-TW" sz="1200" b="0" i="0" kern="1200" dirty="0" smtClean="0">
+                <a:solidFill>
+                  <a:schemeClr val="tx1"/>
+                </a:solidFill>
+                <a:effectLst/>
+                <a:latin typeface="+mn-lt"/>
+                <a:ea typeface="+mn-ea"/>
+                <a:cs typeface="+mn-cs"/>
+              </a:rPr>
+              <a:t>" task. The former comprises disambiguating the occurrences of a small sample of target words which were previously selected, while in the latter all the words in a piece of running text need to be disambiguated. The latter is deemed a more realistic form of evaluation, but the corpus is more expensive to produce because human annotators have to read the definitions for each word in the sequence every time they need to make a tagging judgement, rather than once for a block of instances for the same target word.</a:t>
             </a:r>
             <a:endParaRPr lang="zh-TW" altLang="en-US" dirty="0"/>
           </a:p>
@@ -648,7 +696,7 @@
           <a:p>
             <a:fld id="{1521F4BC-F760-4B74-9395-E6325FFDB988}" type="slidenum">
               <a:rPr lang="zh-TW" altLang="en-US" smtClean="0"/>
-              <a:t>7</a:t>
+              <a:t>2</a:t>
             </a:fld>
             <a:endParaRPr lang="zh-TW" altLang="en-US"/>
           </a:p>
@@ -657,7 +705,7 @@
     </p:spTree>
     <p:extLst>
       <p:ext uri="{BB962C8B-B14F-4D97-AF65-F5344CB8AC3E}">
-        <p14:creationId xmlns:p14="http://schemas.microsoft.com/office/powerpoint/2010/main" val="4090641178"/>
+        <p14:creationId xmlns:p14="http://schemas.microsoft.com/office/powerpoint/2010/main" val="3036264219"/>
       </p:ext>
     </p:extLst>
   </p:cSld>
@@ -713,19 +761,17 @@
           <a:p>
             <a:r>
               <a:rPr lang="en-US" altLang="zh-TW" dirty="0" smtClean="0"/>
-              <a:t>Similar senses occur in similar contexts ,</a:t>
+              <a:t>Corpus: collection of written texts. Really</a:t>
             </a:r>
             <a:r>
               <a:rPr lang="en-US" altLang="zh-TW" baseline="0" dirty="0" smtClean="0"/>
-              <a:t> and thus senses can be induced from text by clustering word occurrences using some measure of similarity of context. Word sense induction (</a:t>
-            </a:r>
-            <a:r>
-              <a:rPr lang="zh-TW" altLang="en-US" baseline="0" dirty="0" smtClean="0"/>
-              <a:t>歸納</a:t>
-            </a:r>
+              <a:t> existing used text.</a:t>
+            </a:r>
+          </a:p>
+          <a:p>
             <a:r>
               <a:rPr lang="en-US" altLang="zh-TW" baseline="0" dirty="0" smtClean="0"/>
-              <a:t>)</a:t>
+              <a:t>All using window of n content words around and statistically analyzing those n words. Two approaches </a:t>
             </a:r>
             <a:endParaRPr lang="zh-TW" altLang="en-US" dirty="0"/>
           </a:p>
@@ -748,7 +794,7 @@
           <a:p>
             <a:fld id="{1521F4BC-F760-4B74-9395-E6325FFDB988}" type="slidenum">
               <a:rPr lang="zh-TW" altLang="en-US" smtClean="0"/>
-              <a:t>8</a:t>
+              <a:t>3</a:t>
             </a:fld>
             <a:endParaRPr lang="zh-TW" altLang="en-US"/>
           </a:p>
@@ -757,7 +803,7 @@
     </p:spTree>
     <p:extLst>
       <p:ext uri="{BB962C8B-B14F-4D97-AF65-F5344CB8AC3E}">
-        <p14:creationId xmlns:p14="http://schemas.microsoft.com/office/powerpoint/2010/main" val="2803804232"/>
+        <p14:creationId xmlns:p14="http://schemas.microsoft.com/office/powerpoint/2010/main" val="687568491"/>
       </p:ext>
     </p:extLst>
   </p:cSld>
@@ -811,6 +857,194 @@
           <a:bodyPr/>
           <a:lstStyle/>
           <a:p>
+            <a:r>
+              <a:rPr lang="en-US" altLang="zh-TW" dirty="0" smtClean="0"/>
+              <a:t>Due to lacking training data, allows labeled and unlabeled data.</a:t>
+            </a:r>
+            <a:endParaRPr lang="zh-TW" altLang="en-US" dirty="0"/>
+          </a:p>
+        </p:txBody>
+      </p:sp>
+      <p:sp>
+        <p:nvSpPr>
+          <p:cNvPr id="4" name="Slide Number Placeholder 3"/>
+          <p:cNvSpPr>
+            <a:spLocks noGrp="1"/>
+          </p:cNvSpPr>
+          <p:nvPr>
+            <p:ph type="sldNum" sz="quarter" idx="10"/>
+          </p:nvPr>
+        </p:nvSpPr>
+        <p:spPr/>
+        <p:txBody>
+          <a:bodyPr/>
+          <a:lstStyle/>
+          <a:p>
+            <a:fld id="{1521F4BC-F760-4B74-9395-E6325FFDB988}" type="slidenum">
+              <a:rPr lang="zh-TW" altLang="en-US" smtClean="0"/>
+              <a:t>6</a:t>
+            </a:fld>
+            <a:endParaRPr lang="zh-TW" altLang="en-US"/>
+          </a:p>
+        </p:txBody>
+      </p:sp>
+    </p:spTree>
+    <p:extLst>
+      <p:ext uri="{BB962C8B-B14F-4D97-AF65-F5344CB8AC3E}">
+        <p14:creationId xmlns:p14="http://schemas.microsoft.com/office/powerpoint/2010/main" val="4090641178"/>
+      </p:ext>
+    </p:extLst>
+  </p:cSld>
+  <p:clrMapOvr>
+    <a:masterClrMapping/>
+  </p:clrMapOvr>
+</p:notes>
+</file>
+
+<file path=ppt/notesSlides/notesSlide5.xml><?xml version="1.0" encoding="utf-8"?>
+<p:notes xmlns:a="http://schemas.openxmlformats.org/drawingml/2006/main" xmlns:r="http://schemas.openxmlformats.org/officeDocument/2006/relationships" xmlns:p="http://schemas.openxmlformats.org/presentationml/2006/main">
+  <p:cSld>
+    <p:spTree>
+      <p:nvGrpSpPr>
+        <p:cNvPr id="1" name=""/>
+        <p:cNvGrpSpPr/>
+        <p:nvPr/>
+      </p:nvGrpSpPr>
+      <p:grpSpPr>
+        <a:xfrm>
+          <a:off x="0" y="0"/>
+          <a:ext cx="0" cy="0"/>
+          <a:chOff x="0" y="0"/>
+          <a:chExt cx="0" cy="0"/>
+        </a:xfrm>
+      </p:grpSpPr>
+      <p:sp>
+        <p:nvSpPr>
+          <p:cNvPr id="2" name="Slide Image Placeholder 1"/>
+          <p:cNvSpPr>
+            <a:spLocks noGrp="1" noRot="1" noChangeAspect="1"/>
+          </p:cNvSpPr>
+          <p:nvPr>
+            <p:ph type="sldImg"/>
+          </p:nvPr>
+        </p:nvSpPr>
+        <p:spPr/>
+      </p:sp>
+      <p:sp>
+        <p:nvSpPr>
+          <p:cNvPr id="3" name="Notes Placeholder 2"/>
+          <p:cNvSpPr>
+            <a:spLocks noGrp="1"/>
+          </p:cNvSpPr>
+          <p:nvPr>
+            <p:ph type="body" idx="1"/>
+          </p:nvPr>
+        </p:nvSpPr>
+        <p:spPr/>
+        <p:txBody>
+          <a:bodyPr/>
+          <a:lstStyle/>
+          <a:p>
+            <a:r>
+              <a:rPr lang="en-US" altLang="zh-TW" dirty="0" smtClean="0"/>
+              <a:t>Similar senses occur in similar contexts ,</a:t>
+            </a:r>
+            <a:r>
+              <a:rPr lang="en-US" altLang="zh-TW" baseline="0" dirty="0" smtClean="0"/>
+              <a:t> and thus senses can be induced from text by clustering word occurrences using some measure of similarity of context. Word sense induction (</a:t>
+            </a:r>
+            <a:r>
+              <a:rPr lang="zh-TW" altLang="en-US" baseline="0" dirty="0" smtClean="0"/>
+              <a:t>歸納</a:t>
+            </a:r>
+            <a:r>
+              <a:rPr lang="en-US" altLang="zh-TW" baseline="0" dirty="0" smtClean="0"/>
+              <a:t>)</a:t>
+            </a:r>
+            <a:endParaRPr lang="zh-TW" altLang="en-US" dirty="0"/>
+          </a:p>
+        </p:txBody>
+      </p:sp>
+      <p:sp>
+        <p:nvSpPr>
+          <p:cNvPr id="4" name="Slide Number Placeholder 3"/>
+          <p:cNvSpPr>
+            <a:spLocks noGrp="1"/>
+          </p:cNvSpPr>
+          <p:nvPr>
+            <p:ph type="sldNum" sz="quarter" idx="10"/>
+          </p:nvPr>
+        </p:nvSpPr>
+        <p:spPr/>
+        <p:txBody>
+          <a:bodyPr/>
+          <a:lstStyle/>
+          <a:p>
+            <a:fld id="{1521F4BC-F760-4B74-9395-E6325FFDB988}" type="slidenum">
+              <a:rPr lang="zh-TW" altLang="en-US" smtClean="0"/>
+              <a:t>7</a:t>
+            </a:fld>
+            <a:endParaRPr lang="zh-TW" altLang="en-US"/>
+          </a:p>
+        </p:txBody>
+      </p:sp>
+    </p:spTree>
+    <p:extLst>
+      <p:ext uri="{BB962C8B-B14F-4D97-AF65-F5344CB8AC3E}">
+        <p14:creationId xmlns:p14="http://schemas.microsoft.com/office/powerpoint/2010/main" val="2803804232"/>
+      </p:ext>
+    </p:extLst>
+  </p:cSld>
+  <p:clrMapOvr>
+    <a:masterClrMapping/>
+  </p:clrMapOvr>
+</p:notes>
+</file>
+
+<file path=ppt/notesSlides/notesSlide6.xml><?xml version="1.0" encoding="utf-8"?>
+<p:notes xmlns:a="http://schemas.openxmlformats.org/drawingml/2006/main" xmlns:r="http://schemas.openxmlformats.org/officeDocument/2006/relationships" xmlns:p="http://schemas.openxmlformats.org/presentationml/2006/main">
+  <p:cSld>
+    <p:spTree>
+      <p:nvGrpSpPr>
+        <p:cNvPr id="1" name=""/>
+        <p:cNvGrpSpPr/>
+        <p:nvPr/>
+      </p:nvGrpSpPr>
+      <p:grpSpPr>
+        <a:xfrm>
+          <a:off x="0" y="0"/>
+          <a:ext cx="0" cy="0"/>
+          <a:chOff x="0" y="0"/>
+          <a:chExt cx="0" cy="0"/>
+        </a:xfrm>
+      </p:grpSpPr>
+      <p:sp>
+        <p:nvSpPr>
+          <p:cNvPr id="2" name="Slide Image Placeholder 1"/>
+          <p:cNvSpPr>
+            <a:spLocks noGrp="1" noRot="1" noChangeAspect="1"/>
+          </p:cNvSpPr>
+          <p:nvPr>
+            <p:ph type="sldImg"/>
+          </p:nvPr>
+        </p:nvSpPr>
+        <p:spPr/>
+      </p:sp>
+      <p:sp>
+        <p:nvSpPr>
+          <p:cNvPr id="3" name="Notes Placeholder 2"/>
+          <p:cNvSpPr>
+            <a:spLocks noGrp="1"/>
+          </p:cNvSpPr>
+          <p:nvPr>
+            <p:ph type="body" idx="1"/>
+          </p:nvPr>
+        </p:nvSpPr>
+        <p:spPr/>
+        <p:txBody>
+          <a:bodyPr/>
+          <a:lstStyle/>
+          <a:p>
             <a:pPr marL="0" marR="0" lvl="0" indent="0" algn="l" defTabSz="914400" rtl="0" eaLnBrk="1" fontAlgn="auto" latinLnBrk="0" hangingPunct="1">
               <a:lnSpc>
                 <a:spcPct val="100000"/>
@@ -889,7 +1123,7 @@
           <a:p>
             <a:fld id="{1521F4BC-F760-4B74-9395-E6325FFDB988}" type="slidenum">
               <a:rPr lang="zh-TW" altLang="en-US" smtClean="0"/>
-              <a:t>10</a:t>
+              <a:t>9</a:t>
             </a:fld>
             <a:endParaRPr lang="zh-TW" altLang="en-US"/>
           </a:p>
@@ -1134,7 +1368,7 @@
           <a:p>
             <a:fld id="{E2B46941-B5CC-40F5-914C-9BC7D4F6DDE4}" type="datetimeFigureOut">
               <a:rPr lang="zh-TW" altLang="en-US" smtClean="0"/>
-              <a:t>2017/9/16</a:t>
+              <a:t>2017/9/18</a:t>
             </a:fld>
             <a:endParaRPr lang="zh-TW" altLang="en-US"/>
           </a:p>
@@ -1342,7 +1576,7 @@
           <a:p>
             <a:fld id="{E2B46941-B5CC-40F5-914C-9BC7D4F6DDE4}" type="datetimeFigureOut">
               <a:rPr lang="zh-TW" altLang="en-US" smtClean="0"/>
-              <a:t>2017/9/16</a:t>
+              <a:t>2017/9/18</a:t>
             </a:fld>
             <a:endParaRPr lang="zh-TW" altLang="en-US"/>
           </a:p>
@@ -1598,7 +1832,7 @@
           <a:p>
             <a:fld id="{E2B46941-B5CC-40F5-914C-9BC7D4F6DDE4}" type="datetimeFigureOut">
               <a:rPr lang="zh-TW" altLang="en-US" smtClean="0"/>
-              <a:t>2017/9/16</a:t>
+              <a:t>2017/9/18</a:t>
             </a:fld>
             <a:endParaRPr lang="zh-TW" altLang="en-US"/>
           </a:p>
@@ -1772,7 +2006,7 @@
           <a:p>
             <a:fld id="{E2B46941-B5CC-40F5-914C-9BC7D4F6DDE4}" type="datetimeFigureOut">
               <a:rPr lang="zh-TW" altLang="en-US" smtClean="0"/>
-              <a:t>2017/9/16</a:t>
+              <a:t>2017/9/18</a:t>
             </a:fld>
             <a:endParaRPr lang="zh-TW" altLang="en-US"/>
           </a:p>
@@ -2115,7 +2349,7 @@
           <a:p>
             <a:fld id="{E2B46941-B5CC-40F5-914C-9BC7D4F6DDE4}" type="datetimeFigureOut">
               <a:rPr lang="zh-TW" altLang="en-US" smtClean="0"/>
-              <a:t>2017/9/16</a:t>
+              <a:t>2017/9/18</a:t>
             </a:fld>
             <a:endParaRPr lang="zh-TW" altLang="en-US"/>
           </a:p>
@@ -2390,7 +2624,7 @@
           <a:p>
             <a:fld id="{E2B46941-B5CC-40F5-914C-9BC7D4F6DDE4}" type="datetimeFigureOut">
               <a:rPr lang="zh-TW" altLang="en-US" smtClean="0"/>
-              <a:t>2017/9/16</a:t>
+              <a:t>2017/9/18</a:t>
             </a:fld>
             <a:endParaRPr lang="zh-TW" altLang="en-US"/>
           </a:p>
@@ -2769,7 +3003,7 @@
           <a:p>
             <a:fld id="{E2B46941-B5CC-40F5-914C-9BC7D4F6DDE4}" type="datetimeFigureOut">
               <a:rPr lang="zh-TW" altLang="en-US" smtClean="0"/>
-              <a:t>2017/9/16</a:t>
+              <a:t>2017/9/18</a:t>
             </a:fld>
             <a:endParaRPr lang="zh-TW" altLang="en-US"/>
           </a:p>
@@ -2887,7 +3121,7 @@
           <a:p>
             <a:fld id="{E2B46941-B5CC-40F5-914C-9BC7D4F6DDE4}" type="datetimeFigureOut">
               <a:rPr lang="zh-TW" altLang="en-US" smtClean="0"/>
-              <a:t>2017/9/16</a:t>
+              <a:t>2017/9/18</a:t>
             </a:fld>
             <a:endParaRPr lang="zh-TW" altLang="en-US"/>
           </a:p>
@@ -3058,7 +3292,7 @@
           <a:p>
             <a:fld id="{E2B46941-B5CC-40F5-914C-9BC7D4F6DDE4}" type="datetimeFigureOut">
               <a:rPr lang="zh-TW" altLang="en-US" smtClean="0"/>
-              <a:t>2017/9/16</a:t>
+              <a:t>2017/9/18</a:t>
             </a:fld>
             <a:endParaRPr lang="zh-TW" altLang="en-US"/>
           </a:p>
@@ -3412,7 +3646,7 @@
           <a:p>
             <a:fld id="{E2B46941-B5CC-40F5-914C-9BC7D4F6DDE4}" type="datetimeFigureOut">
               <a:rPr lang="zh-TW" altLang="en-US" smtClean="0"/>
-              <a:t>2017/9/16</a:t>
+              <a:t>2017/9/18</a:t>
             </a:fld>
             <a:endParaRPr lang="zh-TW" altLang="en-US"/>
           </a:p>
@@ -3794,7 +4028,7 @@
           <a:p>
             <a:fld id="{E2B46941-B5CC-40F5-914C-9BC7D4F6DDE4}" type="datetimeFigureOut">
               <a:rPr lang="zh-TW" altLang="en-US" smtClean="0"/>
-              <a:t>2017/9/16</a:t>
+              <a:t>2017/9/18</a:t>
             </a:fld>
             <a:endParaRPr lang="zh-TW" altLang="en-US"/>
           </a:p>
@@ -4081,7 +4315,7 @@
           <a:p>
             <a:fld id="{E2B46941-B5CC-40F5-914C-9BC7D4F6DDE4}" type="datetimeFigureOut">
               <a:rPr lang="zh-TW" altLang="en-US" smtClean="0"/>
-              <a:t>2017/9/16</a:t>
+              <a:t>2017/9/18</a:t>
             </a:fld>
             <a:endParaRPr lang="zh-TW" altLang="en-US"/>
           </a:p>
@@ -4622,7 +4856,15 @@
           <a:p>
             <a:r>
               <a:rPr lang="en-US" altLang="zh-TW" dirty="0" smtClean="0"/>
-              <a:t>Word-sense disambiguation</a:t>
+              <a:t>Word-Sense </a:t>
+            </a:r>
+            <a:r>
+              <a:rPr lang="en-US" altLang="zh-TW" dirty="0"/>
+              <a:t>D</a:t>
+            </a:r>
+            <a:r>
+              <a:rPr lang="en-US" altLang="zh-TW" dirty="0" smtClean="0"/>
+              <a:t>isambiguation</a:t>
             </a:r>
             <a:endParaRPr lang="zh-TW" altLang="en-US" dirty="0"/>
           </a:p>
@@ -4646,6 +4888,29 @@
             <a:r>
               <a:rPr lang="en-US" altLang="zh-TW" dirty="0" smtClean="0"/>
               <a:t>In computational linguistics</a:t>
+            </a:r>
+            <a:endParaRPr lang="zh-TW" altLang="en-US" dirty="0"/>
+          </a:p>
+        </p:txBody>
+      </p:sp>
+      <p:sp>
+        <p:nvSpPr>
+          <p:cNvPr id="4" name="Footer Placeholder 3"/>
+          <p:cNvSpPr>
+            <a:spLocks noGrp="1"/>
+          </p:cNvSpPr>
+          <p:nvPr>
+            <p:ph type="ftr" sz="quarter" idx="11"/>
+          </p:nvPr>
+        </p:nvSpPr>
+        <p:spPr/>
+        <p:txBody>
+          <a:bodyPr/>
+          <a:lstStyle/>
+          <a:p>
+            <a:r>
+              <a:rPr lang="en-US" altLang="zh-TW" dirty="0" smtClean="0"/>
+              <a:t>Hung-Ruey Chen</a:t>
             </a:r>
             <a:endParaRPr lang="zh-TW" altLang="en-US" dirty="0"/>
           </a:p>
@@ -4655,103 +4920,6 @@
     <p:extLst>
       <p:ext uri="{BB962C8B-B14F-4D97-AF65-F5344CB8AC3E}">
         <p14:creationId xmlns:p14="http://schemas.microsoft.com/office/powerpoint/2010/main" val="4005887473"/>
-      </p:ext>
-    </p:extLst>
-  </p:cSld>
-  <p:clrMapOvr>
-    <a:masterClrMapping/>
-  </p:clrMapOvr>
-</p:sld>
-</file>
-
-<file path=ppt/slides/slide10.xml><?xml version="1.0" encoding="utf-8"?>
-<p:sld xmlns:a="http://schemas.openxmlformats.org/drawingml/2006/main" xmlns:r="http://schemas.openxmlformats.org/officeDocument/2006/relationships" xmlns:p="http://schemas.openxmlformats.org/presentationml/2006/main">
-  <p:cSld>
-    <p:spTree>
-      <p:nvGrpSpPr>
-        <p:cNvPr id="1" name=""/>
-        <p:cNvGrpSpPr/>
-        <p:nvPr/>
-      </p:nvGrpSpPr>
-      <p:grpSpPr>
-        <a:xfrm>
-          <a:off x="0" y="0"/>
-          <a:ext cx="0" cy="0"/>
-          <a:chOff x="0" y="0"/>
-          <a:chExt cx="0" cy="0"/>
-        </a:xfrm>
-      </p:grpSpPr>
-      <p:sp>
-        <p:nvSpPr>
-          <p:cNvPr id="2" name="Title 1"/>
-          <p:cNvSpPr>
-            <a:spLocks noGrp="1"/>
-          </p:cNvSpPr>
-          <p:nvPr>
-            <p:ph type="title"/>
-          </p:nvPr>
-        </p:nvSpPr>
-        <p:spPr/>
-        <p:txBody>
-          <a:bodyPr/>
-          <a:lstStyle/>
-          <a:p>
-            <a:r>
-              <a:rPr lang="en-US" altLang="zh-TW" dirty="0" smtClean="0"/>
-              <a:t>Quick summary</a:t>
-            </a:r>
-            <a:endParaRPr lang="zh-TW" altLang="en-US" dirty="0"/>
-          </a:p>
-        </p:txBody>
-      </p:sp>
-      <p:sp>
-        <p:nvSpPr>
-          <p:cNvPr id="3" name="Content Placeholder 2"/>
-          <p:cNvSpPr>
-            <a:spLocks noGrp="1"/>
-          </p:cNvSpPr>
-          <p:nvPr>
-            <p:ph idx="1"/>
-          </p:nvPr>
-        </p:nvSpPr>
-        <p:spPr/>
-        <p:txBody>
-          <a:bodyPr/>
-          <a:lstStyle/>
-          <a:p>
-            <a:r>
-              <a:rPr lang="en-US" altLang="zh-TW" dirty="0" smtClean="0"/>
-              <a:t>- Knowledge bottleneck is major problem to solve WSD.</a:t>
-            </a:r>
-          </a:p>
-          <a:p>
-            <a:r>
-              <a:rPr lang="en-US" altLang="zh-TW" dirty="0" smtClean="0"/>
-              <a:t>- Unsupervised methods rely on knowledge about word senses.</a:t>
-            </a:r>
-          </a:p>
-          <a:p>
-            <a:r>
-              <a:rPr lang="en-US" altLang="zh-TW" dirty="0" smtClean="0"/>
-              <a:t>- Supervised methods depend manually annotated examples.</a:t>
-            </a:r>
-          </a:p>
-          <a:p>
-            <a:endParaRPr lang="en-US" altLang="zh-TW" dirty="0"/>
-          </a:p>
-          <a:p>
-            <a:r>
-              <a:rPr lang="en-US" altLang="zh-TW" dirty="0" smtClean="0"/>
-              <a:t>Future: Using largest corpus– World Wide Web for lexical information automatically. </a:t>
-            </a:r>
-            <a:endParaRPr lang="zh-TW" altLang="en-US" dirty="0"/>
-          </a:p>
-        </p:txBody>
-      </p:sp>
-    </p:spTree>
-    <p:extLst>
-      <p:ext uri="{BB962C8B-B14F-4D97-AF65-F5344CB8AC3E}">
-        <p14:creationId xmlns:p14="http://schemas.microsoft.com/office/powerpoint/2010/main" val="190247962"/>
       </p:ext>
     </p:extLst>
   </p:cSld>
@@ -4795,7 +4963,11 @@
           <a:p>
             <a:r>
               <a:rPr lang="en-US" altLang="zh-TW" dirty="0" smtClean="0"/>
-              <a:t>WSD task variants</a:t>
+              <a:t>WSD </a:t>
+            </a:r>
+            <a:r>
+              <a:rPr lang="en-US" altLang="zh-TW" dirty="0" smtClean="0"/>
+              <a:t>Task Variants</a:t>
             </a:r>
             <a:endParaRPr lang="zh-TW" altLang="en-US" dirty="0"/>
           </a:p>
@@ -4876,43 +5048,117 @@
           <a:lstStyle/>
           <a:p>
             <a:r>
+              <a:rPr lang="en-US" altLang="zh-TW" smtClean="0"/>
+              <a:t>Approaches: Deep and Shallow</a:t>
+            </a:r>
+            <a:endParaRPr lang="zh-TW" altLang="en-US" dirty="0"/>
+          </a:p>
+        </p:txBody>
+      </p:sp>
+      <p:sp>
+        <p:nvSpPr>
+          <p:cNvPr id="3" name="Content Placeholder 2"/>
+          <p:cNvSpPr>
+            <a:spLocks noGrp="1"/>
+          </p:cNvSpPr>
+          <p:nvPr>
+            <p:ph idx="1"/>
+          </p:nvPr>
+        </p:nvSpPr>
+        <p:spPr/>
+        <p:txBody>
+          <a:bodyPr>
+            <a:normAutofit/>
+          </a:bodyPr>
+          <a:lstStyle/>
+          <a:p>
+            <a:r>
               <a:rPr lang="en-US" altLang="zh-TW" dirty="0" smtClean="0"/>
-              <a:t>Part-of-speech tagging</a:t>
-            </a:r>
-            <a:endParaRPr lang="zh-TW" altLang="en-US" dirty="0"/>
-          </a:p>
-        </p:txBody>
-      </p:sp>
-      <p:sp>
-        <p:nvSpPr>
-          <p:cNvPr id="3" name="Content Placeholder 2"/>
-          <p:cNvSpPr>
-            <a:spLocks noGrp="1"/>
-          </p:cNvSpPr>
-          <p:nvPr>
-            <p:ph idx="1"/>
-          </p:nvPr>
-        </p:nvSpPr>
-        <p:spPr/>
-        <p:txBody>
-          <a:bodyPr/>
-          <a:lstStyle/>
-          <a:p>
+              <a:t>1. Dictionary and knowledge-based methods:</a:t>
+            </a:r>
+          </a:p>
+          <a:p>
+            <a:pPr lvl="1"/>
             <a:r>
               <a:rPr lang="en-US" altLang="zh-TW" dirty="0" smtClean="0"/>
-              <a:t>Grammatical tagging or word-category disambiguation</a:t>
+              <a:t>Use dictionary and knowledge bases without any corpus evidence </a:t>
             </a:r>
           </a:p>
           <a:p>
             <a:r>
               <a:rPr lang="en-US" altLang="zh-TW" dirty="0" smtClean="0"/>
-              <a:t>Process of marking up a word in a text as corresponding to part of speech, based on both its definition and its context(relationship with adjacent words in phrase, sentence or paragraph)</a:t>
-            </a:r>
-          </a:p>
-          <a:p>
+              <a:t>2. </a:t>
+            </a:r>
+            <a:r>
+              <a:rPr lang="en-US" altLang="zh-TW" dirty="0"/>
+              <a:t>Supervised methods </a:t>
+            </a:r>
             <a:r>
               <a:rPr lang="en-US" altLang="zh-TW" dirty="0" smtClean="0"/>
-              <a:t>Rule-based and Stochastic</a:t>
+              <a:t>:</a:t>
+            </a:r>
+          </a:p>
+          <a:p>
+            <a:pPr lvl="1"/>
+            <a:r>
+              <a:rPr lang="en-US" altLang="zh-TW" dirty="0"/>
+              <a:t>Use sense annotated </a:t>
+            </a:r>
+            <a:r>
+              <a:rPr lang="en-US" altLang="zh-TW" dirty="0" smtClean="0"/>
+              <a:t>corpora</a:t>
+            </a:r>
+          </a:p>
+          <a:p>
+            <a:r>
+              <a:rPr lang="en-US" altLang="zh-TW" dirty="0" smtClean="0"/>
+              <a:t>3. Semi-supervised or minimally supervised methods:</a:t>
+            </a:r>
+          </a:p>
+          <a:p>
+            <a:pPr lvl="1"/>
+            <a:r>
+              <a:rPr lang="en-US" altLang="zh-TW" dirty="0" smtClean="0"/>
+              <a:t>Use </a:t>
+            </a:r>
+            <a:r>
+              <a:rPr lang="en-US" altLang="zh-TW" dirty="0"/>
+              <a:t>secondary source of knowledge like small annotated </a:t>
+            </a:r>
+            <a:r>
+              <a:rPr lang="en-US" altLang="zh-TW" dirty="0" smtClean="0"/>
+              <a:t>corpus</a:t>
+            </a:r>
+          </a:p>
+          <a:p>
+            <a:r>
+              <a:rPr lang="en-US" altLang="zh-TW" dirty="0" smtClean="0"/>
+              <a:t>4. Unsupervised methods:</a:t>
+            </a:r>
+          </a:p>
+          <a:p>
+            <a:pPr lvl="1"/>
+            <a:r>
+              <a:rPr lang="en-US" altLang="zh-TW" dirty="0" smtClean="0"/>
+              <a:t>Avoid using external information and work directly from raw unannotated corpora. Also word sense discrimination</a:t>
+            </a:r>
+          </a:p>
+          <a:p>
+            <a:pPr marL="201168" lvl="1" indent="0">
+              <a:buNone/>
+            </a:pPr>
+            <a:r>
+              <a:rPr lang="en-US" altLang="zh-TW" dirty="0" smtClean="0"/>
+              <a:t>Approaches Training Methods: </a:t>
+            </a:r>
+          </a:p>
+          <a:p>
+            <a:pPr marL="201168" lvl="1" indent="0">
+              <a:buNone/>
+            </a:pPr>
+            <a:r>
+              <a:rPr lang="en-US" altLang="zh-TW" dirty="0" smtClean="0"/>
+              <a:t>Naïve Bayes Classifiers and Decision Trees. Also kernel-based SVM for supervised learning.</a:t>
             </a:r>
             <a:endParaRPr lang="zh-TW" altLang="en-US" dirty="0"/>
           </a:p>
@@ -4921,7 +5167,7 @@
     </p:spTree>
     <p:extLst>
       <p:ext uri="{BB962C8B-B14F-4D97-AF65-F5344CB8AC3E}">
-        <p14:creationId xmlns:p14="http://schemas.microsoft.com/office/powerpoint/2010/main" val="2516269384"/>
+        <p14:creationId xmlns:p14="http://schemas.microsoft.com/office/powerpoint/2010/main" val="20282814"/>
       </p:ext>
     </p:extLst>
   </p:cSld>
@@ -4960,29 +5206,6 @@
         </p:nvSpPr>
         <p:spPr/>
         <p:txBody>
-          <a:bodyPr/>
-          <a:lstStyle/>
-          <a:p>
-            <a:r>
-              <a:rPr lang="en-US" altLang="zh-TW" dirty="0" smtClean="0"/>
-              <a:t>Approaches</a:t>
-            </a:r>
-            <a:endParaRPr lang="zh-TW" altLang="en-US" dirty="0"/>
-          </a:p>
-        </p:txBody>
-      </p:sp>
-      <p:sp>
-        <p:nvSpPr>
-          <p:cNvPr id="3" name="Content Placeholder 2"/>
-          <p:cNvSpPr>
-            <a:spLocks noGrp="1"/>
-          </p:cNvSpPr>
-          <p:nvPr>
-            <p:ph idx="1"/>
-          </p:nvPr>
-        </p:nvSpPr>
-        <p:spPr/>
-        <p:txBody>
           <a:bodyPr>
             <a:normAutofit/>
           </a:bodyPr>
@@ -4990,91 +5213,74 @@
           <a:p>
             <a:r>
               <a:rPr lang="en-US" altLang="zh-TW" dirty="0" smtClean="0"/>
-              <a:t>1. Dictionary and knowledge-based methods:</a:t>
-            </a:r>
-          </a:p>
-          <a:p>
-            <a:pPr lvl="1"/>
-            <a:r>
-              <a:rPr lang="en-US" altLang="zh-TW" dirty="0" smtClean="0"/>
-              <a:t>Use dictionary and knowledge bases without any corpus evidence </a:t>
-            </a:r>
-          </a:p>
-          <a:p>
-            <a:r>
-              <a:rPr lang="en-US" altLang="zh-TW" dirty="0" smtClean="0"/>
-              <a:t>2. </a:t>
+              <a:t>Dictionary- </a:t>
             </a:r>
             <a:r>
               <a:rPr lang="en-US" altLang="zh-TW" dirty="0"/>
-              <a:t>Supervised methods </a:t>
+              <a:t>and knowledge-based methods</a:t>
             </a:r>
             <a:r>
               <a:rPr lang="en-US" altLang="zh-TW" dirty="0" smtClean="0"/>
               <a:t>:</a:t>
             </a:r>
-          </a:p>
-          <a:p>
-            <a:pPr lvl="1"/>
+            <a:endParaRPr lang="zh-TW" altLang="en-US" dirty="0"/>
+          </a:p>
+        </p:txBody>
+      </p:sp>
+      <p:sp>
+        <p:nvSpPr>
+          <p:cNvPr id="3" name="Content Placeholder 2"/>
+          <p:cNvSpPr>
+            <a:spLocks noGrp="1"/>
+          </p:cNvSpPr>
+          <p:nvPr>
+            <p:ph idx="1"/>
+          </p:nvPr>
+        </p:nvSpPr>
+        <p:spPr/>
+        <p:txBody>
+          <a:bodyPr/>
+          <a:lstStyle/>
+          <a:p>
             <a:r>
               <a:rPr lang="en-US" altLang="zh-TW" dirty="0"/>
-              <a:t>Use sense annotated </a:t>
+              <a:t>Use dictionary and knowledge bases without any corpus </a:t>
             </a:r>
             <a:r>
               <a:rPr lang="en-US" altLang="zh-TW" dirty="0" smtClean="0"/>
-              <a:t>corpora</a:t>
-            </a:r>
-          </a:p>
-          <a:p>
+              <a:t>evidence. </a:t>
+            </a:r>
+          </a:p>
+          <a:p>
+            <a:r>
+              <a:rPr lang="en-US" altLang="zh-TW" dirty="0" err="1" smtClean="0"/>
+              <a:t>Lesk</a:t>
+            </a:r>
             <a:r>
               <a:rPr lang="en-US" altLang="zh-TW" dirty="0" smtClean="0"/>
-              <a:t>3. Semi-supervised or minimally supervised methods:</a:t>
-            </a:r>
-          </a:p>
-          <a:p>
-            <a:pPr lvl="1"/>
+              <a:t> Algorithm: seed of dictionary-based method. Words used together in text are related to each other. The relation can be observed in the definitions of words and their senses. </a:t>
+            </a:r>
+          </a:p>
+          <a:p>
+            <a:r>
+              <a:rPr lang="en-US" altLang="zh-TW" dirty="0" err="1" smtClean="0"/>
+              <a:t>Approachs</a:t>
+            </a:r>
             <a:r>
               <a:rPr lang="en-US" altLang="zh-TW" dirty="0" smtClean="0"/>
-              <a:t>Use </a:t>
-            </a:r>
-            <a:r>
-              <a:rPr lang="en-US" altLang="zh-TW" dirty="0"/>
-              <a:t>secondary source of knowledge like small annotated </a:t>
-            </a:r>
+              <a:t>:</a:t>
+            </a:r>
+          </a:p>
+          <a:p>
             <a:r>
               <a:rPr lang="en-US" altLang="zh-TW" dirty="0" smtClean="0"/>
-              <a:t>corpus</a:t>
+              <a:t>1. Find shortest path between two words.</a:t>
             </a:r>
           </a:p>
           <a:p>
             <a:r>
               <a:rPr lang="en-US" altLang="zh-TW" dirty="0" smtClean="0"/>
-              <a:t>4. Unsupervised methods:</a:t>
-            </a:r>
-          </a:p>
-          <a:p>
-            <a:pPr lvl="1"/>
-            <a:r>
-              <a:rPr lang="en-US" altLang="zh-TW" dirty="0" smtClean="0"/>
-              <a:t>Avoid using external information and work directly from raw unannotated corpora. Also word sense discrimination</a:t>
-            </a:r>
-          </a:p>
-          <a:p>
-            <a:pPr marL="201168" lvl="1" indent="0">
-              <a:buNone/>
-            </a:pPr>
-            <a:r>
-              <a:rPr lang="en-US" altLang="zh-TW" dirty="0" smtClean="0"/>
-              <a:t>Approaches Training Methods: </a:t>
-            </a:r>
-          </a:p>
-          <a:p>
-            <a:pPr marL="201168" lvl="1" indent="0">
-              <a:buNone/>
-            </a:pPr>
-            <a:r>
-              <a:rPr lang="en-US" altLang="zh-TW" dirty="0" smtClean="0"/>
-              <a:t>Naïve Bayes Classifiers and Decision Trees. Also kernel-based SVM for supervised learning.</a:t>
+              <a:t>2. Consider general word-sense relatedness to compute the semantic similarity of each pair of word senses based on a given knowledge base. E.g. graph-based approaches better than supervised methods. Transfer knowledge in semantic relations from Wiki to WordNet.</a:t>
             </a:r>
             <a:endParaRPr lang="zh-TW" altLang="en-US" dirty="0"/>
           </a:p>
@@ -5083,7 +5289,7 @@
     </p:spTree>
     <p:extLst>
       <p:ext uri="{BB962C8B-B14F-4D97-AF65-F5344CB8AC3E}">
-        <p14:creationId xmlns:p14="http://schemas.microsoft.com/office/powerpoint/2010/main" val="20282814"/>
+        <p14:creationId xmlns:p14="http://schemas.microsoft.com/office/powerpoint/2010/main" val="2111461354"/>
       </p:ext>
     </p:extLst>
   </p:cSld>
@@ -5122,81 +5328,41 @@
         </p:nvSpPr>
         <p:spPr/>
         <p:txBody>
-          <a:bodyPr>
-            <a:normAutofit/>
-          </a:bodyPr>
+          <a:bodyPr/>
           <a:lstStyle/>
           <a:p>
             <a:r>
               <a:rPr lang="en-US" altLang="zh-TW" dirty="0" smtClean="0"/>
-              <a:t>Dictionary- </a:t>
-            </a:r>
-            <a:r>
-              <a:rPr lang="en-US" altLang="zh-TW" dirty="0"/>
-              <a:t>and knowledge-based methods</a:t>
-            </a:r>
+              <a:t>Supervised methods</a:t>
+            </a:r>
+            <a:endParaRPr lang="zh-TW" altLang="en-US" dirty="0"/>
+          </a:p>
+        </p:txBody>
+      </p:sp>
+      <p:sp>
+        <p:nvSpPr>
+          <p:cNvPr id="3" name="Content Placeholder 2"/>
+          <p:cNvSpPr>
+            <a:spLocks noGrp="1"/>
+          </p:cNvSpPr>
+          <p:nvPr>
+            <p:ph idx="1"/>
+          </p:nvPr>
+        </p:nvSpPr>
+        <p:spPr/>
+        <p:txBody>
+          <a:bodyPr/>
+          <a:lstStyle/>
+          <a:p>
             <a:r>
               <a:rPr lang="en-US" altLang="zh-TW" dirty="0" smtClean="0"/>
-              <a:t>:</a:t>
-            </a:r>
-            <a:endParaRPr lang="zh-TW" altLang="en-US" dirty="0"/>
-          </a:p>
-        </p:txBody>
-      </p:sp>
-      <p:sp>
-        <p:nvSpPr>
-          <p:cNvPr id="3" name="Content Placeholder 2"/>
-          <p:cNvSpPr>
-            <a:spLocks noGrp="1"/>
-          </p:cNvSpPr>
-          <p:nvPr>
-            <p:ph idx="1"/>
-          </p:nvPr>
-        </p:nvSpPr>
-        <p:spPr/>
-        <p:txBody>
-          <a:bodyPr/>
-          <a:lstStyle/>
-          <a:p>
-            <a:r>
-              <a:rPr lang="en-US" altLang="zh-TW" dirty="0"/>
-              <a:t>Use dictionary and knowledge bases without any corpus </a:t>
-            </a:r>
+              <a:t>Assume context can provide enough evidence on its own to disambiguate words. No need common sense and reasoning. SVM and memory-based are most successful approaches.</a:t>
+            </a:r>
+          </a:p>
+          <a:p>
             <a:r>
               <a:rPr lang="en-US" altLang="zh-TW" dirty="0" smtClean="0"/>
-              <a:t>evidence. </a:t>
-            </a:r>
-          </a:p>
-          <a:p>
-            <a:r>
-              <a:rPr lang="en-US" altLang="zh-TW" dirty="0" err="1" smtClean="0"/>
-              <a:t>Lesk</a:t>
-            </a:r>
-            <a:r>
-              <a:rPr lang="en-US" altLang="zh-TW" dirty="0" smtClean="0"/>
-              <a:t> Algorithm: seed of dictionary-based method. Words used together in text are related to each other. The relation can be observed in the definitions of words and their senses. </a:t>
-            </a:r>
-          </a:p>
-          <a:p>
-            <a:r>
-              <a:rPr lang="en-US" altLang="zh-TW" dirty="0" err="1" smtClean="0"/>
-              <a:t>Approachs</a:t>
-            </a:r>
-            <a:r>
-              <a:rPr lang="en-US" altLang="zh-TW" dirty="0" smtClean="0"/>
-              <a:t>:</a:t>
-            </a:r>
-          </a:p>
-          <a:p>
-            <a:r>
-              <a:rPr lang="en-US" altLang="zh-TW" dirty="0" smtClean="0"/>
-              <a:t>1. Find shortest path between two words.</a:t>
-            </a:r>
-          </a:p>
-          <a:p>
-            <a:r>
-              <a:rPr lang="en-US" altLang="zh-TW" dirty="0" smtClean="0"/>
-              <a:t>2. Consider general word-sense relatedness to compute the semantic similarity of each pair of word senses based on a given knowledge base. E.g. graph-based approaches better than supervised methods. Transfer knowledge in semantic relations from Wiki to WordNet.</a:t>
+              <a:t>Now supervised methods are subject to bottleneck since they rely on large amounts of manually sense-tagged corpora for training.</a:t>
             </a:r>
             <a:endParaRPr lang="zh-TW" altLang="en-US" dirty="0"/>
           </a:p>
@@ -5205,7 +5371,7 @@
     </p:spTree>
     <p:extLst>
       <p:ext uri="{BB962C8B-B14F-4D97-AF65-F5344CB8AC3E}">
-        <p14:creationId xmlns:p14="http://schemas.microsoft.com/office/powerpoint/2010/main" val="2111461354"/>
+        <p14:creationId xmlns:p14="http://schemas.microsoft.com/office/powerpoint/2010/main" val="1735277057"/>
       </p:ext>
     </p:extLst>
   </p:cSld>
@@ -5249,7 +5415,7 @@
           <a:p>
             <a:r>
               <a:rPr lang="en-US" altLang="zh-TW" dirty="0" smtClean="0"/>
-              <a:t>Supervised methods</a:t>
+              <a:t>Semi-supervised methods</a:t>
             </a:r>
             <a:endParaRPr lang="zh-TW" altLang="en-US" dirty="0"/>
           </a:p>
@@ -5272,22 +5438,22 @@
           <a:p>
             <a:r>
               <a:rPr lang="en-US" altLang="zh-TW" dirty="0" smtClean="0"/>
-              <a:t>Assume context can provide enough evidence on its own to disambiguate words. No need common sense and reasoning. SVM and memory-based are most successful approaches.</a:t>
+              <a:t>Allows labeled and unlabeled data.</a:t>
             </a:r>
           </a:p>
           <a:p>
             <a:r>
               <a:rPr lang="en-US" altLang="zh-TW" dirty="0" smtClean="0"/>
-              <a:t>Now supervised methods are subject to bottleneck since they rely on large amounts of manually sense-tagged corpora for training.</a:t>
-            </a:r>
-            <a:endParaRPr lang="zh-TW" altLang="en-US" dirty="0"/>
+              <a:t>Bootstrapping approach: start from small amount seed data for each word, either manually tagged training samples or small number of decision rules. Use seed data for initial classifier and any supervised method. Then use most confident classifications on untagged corpus to extract larger training set. Repeat process, each classifier being trained on larger training dataset.</a:t>
+            </a:r>
+            <a:endParaRPr lang="en-US" altLang="zh-TW" dirty="0"/>
           </a:p>
         </p:txBody>
       </p:sp>
     </p:spTree>
     <p:extLst>
       <p:ext uri="{BB962C8B-B14F-4D97-AF65-F5344CB8AC3E}">
-        <p14:creationId xmlns:p14="http://schemas.microsoft.com/office/powerpoint/2010/main" val="1735277057"/>
+        <p14:creationId xmlns:p14="http://schemas.microsoft.com/office/powerpoint/2010/main" val="664300286"/>
       </p:ext>
     </p:extLst>
   </p:cSld>
@@ -5331,7 +5497,7 @@
           <a:p>
             <a:r>
               <a:rPr lang="en-US" altLang="zh-TW" dirty="0" smtClean="0"/>
-              <a:t>Semi-supervised methods</a:t>
+              <a:t>Unsupervised methods</a:t>
             </a:r>
             <a:endParaRPr lang="zh-TW" altLang="en-US" dirty="0"/>
           </a:p>
@@ -5354,22 +5520,20 @@
           <a:p>
             <a:r>
               <a:rPr lang="en-US" altLang="zh-TW" dirty="0" smtClean="0"/>
-              <a:t>Allows labeled and unlabeled data.</a:t>
-            </a:r>
-          </a:p>
-          <a:p>
-            <a:r>
-              <a:rPr lang="en-US" altLang="zh-TW" dirty="0" smtClean="0"/>
-              <a:t>Bootstrapping approach: start from small amount seed data for each word, either manually tagged training samples or small number of decision rules. Use seed data for initial classifier and any supervised method. Then use most confident classifications on untagged corpus to extract larger training set. Repeat process, each classifier being trained on larger training dataset.</a:t>
-            </a:r>
-            <a:endParaRPr lang="en-US" altLang="zh-TW" dirty="0"/>
+              <a:t>Clustering word occurrences using similarity of context. New occurrences of the word can be classified into closest clusters. </a:t>
+            </a:r>
+            <a:r>
+              <a:rPr lang="en-US" altLang="zh-TW" dirty="0"/>
+              <a:t>Performance lower.</a:t>
+            </a:r>
+            <a:endParaRPr lang="zh-TW" altLang="en-US" dirty="0"/>
           </a:p>
         </p:txBody>
       </p:sp>
     </p:spTree>
     <p:extLst>
       <p:ext uri="{BB962C8B-B14F-4D97-AF65-F5344CB8AC3E}">
-        <p14:creationId xmlns:p14="http://schemas.microsoft.com/office/powerpoint/2010/main" val="664300286"/>
+        <p14:creationId xmlns:p14="http://schemas.microsoft.com/office/powerpoint/2010/main" val="3488865375"/>
       </p:ext>
     </p:extLst>
   </p:cSld>
@@ -5413,7 +5577,7 @@
           <a:p>
             <a:r>
               <a:rPr lang="en-US" altLang="zh-TW" dirty="0" smtClean="0"/>
-              <a:t>Unsupervised methods</a:t>
+              <a:t>Other approaches</a:t>
             </a:r>
             <a:endParaRPr lang="zh-TW" altLang="en-US" dirty="0"/>
           </a:p>
@@ -5436,20 +5600,52 @@
           <a:p>
             <a:r>
               <a:rPr lang="en-US" altLang="zh-TW" dirty="0" smtClean="0"/>
-              <a:t>Clustering word occurrences using similarity of context. New occurrences of the word can be classified into closest clusters. </a:t>
-            </a:r>
-            <a:r>
-              <a:rPr lang="en-US" altLang="zh-TW" dirty="0"/>
-              <a:t>Performance lower.</a:t>
-            </a:r>
-            <a:endParaRPr lang="zh-TW" altLang="en-US" dirty="0"/>
+              <a:t>- Disambiguation based on operational semantics of </a:t>
+            </a:r>
+            <a:r>
+              <a:rPr lang="en-US" altLang="zh-TW" i="1" dirty="0" smtClean="0"/>
+              <a:t>default logic</a:t>
+            </a:r>
+          </a:p>
+          <a:p>
+            <a:r>
+              <a:rPr lang="en-US" altLang="zh-TW" dirty="0" smtClean="0"/>
+              <a:t>- Domain-driven disambiguation</a:t>
+            </a:r>
+          </a:p>
+          <a:p>
+            <a:r>
+              <a:rPr lang="en-US" altLang="zh-TW" dirty="0" smtClean="0"/>
+              <a:t>- Identification of dominant word senses</a:t>
+            </a:r>
+          </a:p>
+          <a:p>
+            <a:r>
+              <a:rPr lang="en-US" altLang="zh-TW" dirty="0" smtClean="0"/>
+              <a:t>- WSD using </a:t>
+            </a:r>
+            <a:r>
+              <a:rPr lang="en-US" altLang="zh-TW" i="1" dirty="0" smtClean="0"/>
+              <a:t>Cross-Lingual Evidence</a:t>
+            </a:r>
+          </a:p>
+          <a:p>
+            <a:r>
+              <a:rPr lang="en-US" altLang="zh-TW" i="1" dirty="0" smtClean="0"/>
+              <a:t>- </a:t>
+            </a:r>
+            <a:r>
+              <a:rPr lang="en-US" altLang="zh-TW" dirty="0" smtClean="0"/>
+              <a:t>WSD by multi-lingual NLU</a:t>
+            </a:r>
+            <a:endParaRPr lang="zh-TW" altLang="en-US" i="1" dirty="0"/>
           </a:p>
         </p:txBody>
       </p:sp>
     </p:spTree>
     <p:extLst>
       <p:ext uri="{BB962C8B-B14F-4D97-AF65-F5344CB8AC3E}">
-        <p14:creationId xmlns:p14="http://schemas.microsoft.com/office/powerpoint/2010/main" val="3488865375"/>
+        <p14:creationId xmlns:p14="http://schemas.microsoft.com/office/powerpoint/2010/main" val="1263245992"/>
       </p:ext>
     </p:extLst>
   </p:cSld>
@@ -5493,7 +5689,7 @@
           <a:p>
             <a:r>
               <a:rPr lang="en-US" altLang="zh-TW" dirty="0" smtClean="0"/>
-              <a:t>Other approaches</a:t>
+              <a:t>Quick summary</a:t>
             </a:r>
             <a:endParaRPr lang="zh-TW" altLang="en-US" dirty="0"/>
           </a:p>
@@ -5516,52 +5712,37 @@
           <a:p>
             <a:r>
               <a:rPr lang="en-US" altLang="zh-TW" dirty="0" smtClean="0"/>
-              <a:t>- Disambiguation based on operational semantics of </a:t>
-            </a:r>
-            <a:r>
-              <a:rPr lang="en-US" altLang="zh-TW" i="1" dirty="0" smtClean="0"/>
-              <a:t>default logic</a:t>
+              <a:t>- Knowledge bottleneck is major problem to solve WSD.</a:t>
             </a:r>
           </a:p>
           <a:p>
             <a:r>
               <a:rPr lang="en-US" altLang="zh-TW" dirty="0" smtClean="0"/>
-              <a:t>- Domain-driven disambiguation</a:t>
+              <a:t>- Unsupervised methods rely on knowledge about word senses.</a:t>
             </a:r>
           </a:p>
           <a:p>
             <a:r>
               <a:rPr lang="en-US" altLang="zh-TW" dirty="0" smtClean="0"/>
-              <a:t>- Identification of dominant word senses</a:t>
-            </a:r>
+              <a:t>- Supervised methods depend manually annotated examples.</a:t>
+            </a:r>
+          </a:p>
+          <a:p>
+            <a:endParaRPr lang="en-US" altLang="zh-TW" dirty="0"/>
           </a:p>
           <a:p>
             <a:r>
               <a:rPr lang="en-US" altLang="zh-TW" dirty="0" smtClean="0"/>
-              <a:t>- WSD using </a:t>
-            </a:r>
-            <a:r>
-              <a:rPr lang="en-US" altLang="zh-TW" i="1" dirty="0" smtClean="0"/>
-              <a:t>Cross-Lingual Evidence</a:t>
-            </a:r>
-          </a:p>
-          <a:p>
-            <a:r>
-              <a:rPr lang="en-US" altLang="zh-TW" i="1" dirty="0" smtClean="0"/>
-              <a:t>- </a:t>
-            </a:r>
-            <a:r>
-              <a:rPr lang="en-US" altLang="zh-TW" dirty="0" smtClean="0"/>
-              <a:t>WSD by multi-lingual NLU</a:t>
-            </a:r>
-            <a:endParaRPr lang="zh-TW" altLang="en-US" i="1" dirty="0"/>
+              <a:t>Future: Using largest corpus– World Wide Web for lexical information automatically. </a:t>
+            </a:r>
+            <a:endParaRPr lang="zh-TW" altLang="en-US" dirty="0"/>
           </a:p>
         </p:txBody>
       </p:sp>
     </p:spTree>
     <p:extLst>
       <p:ext uri="{BB962C8B-B14F-4D97-AF65-F5344CB8AC3E}">
-        <p14:creationId xmlns:p14="http://schemas.microsoft.com/office/powerpoint/2010/main" val="1263245992"/>
+        <p14:creationId xmlns:p14="http://schemas.microsoft.com/office/powerpoint/2010/main" val="190247962"/>
       </p:ext>
     </p:extLst>
   </p:cSld>

</xml_diff>